<commit_message>
Update slides for 2018
</commit_message>
<xml_diff>
--- a/2018/python/day3-review.pptx
+++ b/2018/python/day3-review.pptx
@@ -5,21 +5,19 @@
     <p:sldMasterId id="2147483648" r:id="rId1"/>
   </p:sldMasterIdLst>
   <p:notesMasterIdLst>
-    <p:notesMasterId r:id="rId14"/>
+    <p:notesMasterId r:id="rId12"/>
   </p:notesMasterIdLst>
   <p:sldIdLst>
     <p:sldId id="257" r:id="rId2"/>
-    <p:sldId id="262" r:id="rId3"/>
-    <p:sldId id="263" r:id="rId4"/>
-    <p:sldId id="264" r:id="rId5"/>
-    <p:sldId id="265" r:id="rId6"/>
-    <p:sldId id="266" r:id="rId7"/>
-    <p:sldId id="267" r:id="rId8"/>
-    <p:sldId id="268" r:id="rId9"/>
-    <p:sldId id="259" r:id="rId10"/>
-    <p:sldId id="269" r:id="rId11"/>
-    <p:sldId id="260" r:id="rId12"/>
-    <p:sldId id="261" r:id="rId13"/>
+    <p:sldId id="264" r:id="rId3"/>
+    <p:sldId id="265" r:id="rId4"/>
+    <p:sldId id="266" r:id="rId5"/>
+    <p:sldId id="267" r:id="rId6"/>
+    <p:sldId id="268" r:id="rId7"/>
+    <p:sldId id="269" r:id="rId8"/>
+    <p:sldId id="259" r:id="rId9"/>
+    <p:sldId id="260" r:id="rId10"/>
+    <p:sldId id="261" r:id="rId11"/>
   </p:sldIdLst>
   <p:sldSz cx="9144000" cy="6858000" type="screen4x3"/>
   <p:notesSz cx="6858000" cy="9144000"/>
@@ -120,7 +118,7 @@
   </p:defaultTextStyle>
   <p:extLst>
     <p:ext uri="{EFAFB233-063F-42B5-8137-9DF3F51BA10A}">
-      <p15:sldGuideLst xmlns="" xmlns:p15="http://schemas.microsoft.com/office/powerpoint/2012/main">
+      <p15:sldGuideLst xmlns:p15="http://schemas.microsoft.com/office/powerpoint/2012/main" xmlns="">
         <p15:guide id="1" orient="horz" pos="2160">
           <p15:clr>
             <a:srgbClr val="A4A3A4"/>
@@ -219,7 +217,7 @@
           <a:p>
             <a:fld id="{7E606E04-4287-FC46-B3F7-13FA665EE46E}" type="datetimeFigureOut">
               <a:rPr lang="en-US" smtClean="0"/>
-              <a:t>5/30/18</a:t>
+              <a:t>6/7/18</a:t>
             </a:fld>
             <a:endParaRPr lang="en-US"/>
           </a:p>
@@ -598,7 +596,7 @@
 </p:notes>
 </file>
 
-<file path=ppt/notesSlides/notesSlide10.xml><?xml version="1.0" encoding="utf-8"?>
+<file path=ppt/notesSlides/notesSlide2.xml><?xml version="1.0" encoding="utf-8"?>
 <p:notes xmlns:a="http://schemas.openxmlformats.org/drawingml/2006/main" xmlns:r="http://schemas.openxmlformats.org/officeDocument/2006/relationships" xmlns:p="http://schemas.openxmlformats.org/presentationml/2006/main" showMasterSp="0" showMasterPhAnim="0">
   <p:cSld>
     <p:spTree>
@@ -702,6 +700,11 @@
         </p:txBody>
       </p:sp>
     </p:spTree>
+    <p:extLst>
+      <p:ext uri="{BB962C8B-B14F-4D97-AF65-F5344CB8AC3E}">
+        <p14:creationId xmlns:p14="http://schemas.microsoft.com/office/powerpoint/2010/main" val="138821827"/>
+      </p:ext>
+    </p:extLst>
   </p:cSld>
   <p:clrMapOvr>
     <a:masterClrMapping/>
@@ -709,7 +712,7 @@
 </p:notes>
 </file>
 
-<file path=ppt/notesSlides/notesSlide2.xml><?xml version="1.0" encoding="utf-8"?>
+<file path=ppt/notesSlides/notesSlide3.xml><?xml version="1.0" encoding="utf-8"?>
 <p:notes xmlns:a="http://schemas.openxmlformats.org/drawingml/2006/main" xmlns:r="http://schemas.openxmlformats.org/officeDocument/2006/relationships" xmlns:p="http://schemas.openxmlformats.org/presentationml/2006/main" showMasterSp="0" showMasterPhAnim="0">
   <p:cSld>
     <p:spTree>
@@ -815,7 +818,7 @@
     </p:spTree>
     <p:extLst>
       <p:ext uri="{BB962C8B-B14F-4D97-AF65-F5344CB8AC3E}">
-        <p14:creationId xmlns:p14="http://schemas.microsoft.com/office/powerpoint/2010/main" val="3052906736"/>
+        <p14:creationId xmlns:p14="http://schemas.microsoft.com/office/powerpoint/2010/main" val="2189643892"/>
       </p:ext>
     </p:extLst>
   </p:cSld>
@@ -825,7 +828,7 @@
 </p:notes>
 </file>
 
-<file path=ppt/notesSlides/notesSlide3.xml><?xml version="1.0" encoding="utf-8"?>
+<file path=ppt/notesSlides/notesSlide4.xml><?xml version="1.0" encoding="utf-8"?>
 <p:notes xmlns:a="http://schemas.openxmlformats.org/drawingml/2006/main" xmlns:r="http://schemas.openxmlformats.org/officeDocument/2006/relationships" xmlns:p="http://schemas.openxmlformats.org/presentationml/2006/main" showMasterSp="0" showMasterPhAnim="0">
   <p:cSld>
     <p:spTree>
@@ -931,7 +934,7 @@
     </p:spTree>
     <p:extLst>
       <p:ext uri="{BB962C8B-B14F-4D97-AF65-F5344CB8AC3E}">
-        <p14:creationId xmlns:p14="http://schemas.microsoft.com/office/powerpoint/2010/main" val="4045234991"/>
+        <p14:creationId xmlns:p14="http://schemas.microsoft.com/office/powerpoint/2010/main" val="3046462791"/>
       </p:ext>
     </p:extLst>
   </p:cSld>
@@ -941,7 +944,7 @@
 </p:notes>
 </file>
 
-<file path=ppt/notesSlides/notesSlide4.xml><?xml version="1.0" encoding="utf-8"?>
+<file path=ppt/notesSlides/notesSlide5.xml><?xml version="1.0" encoding="utf-8"?>
 <p:notes xmlns:a="http://schemas.openxmlformats.org/drawingml/2006/main" xmlns:r="http://schemas.openxmlformats.org/officeDocument/2006/relationships" xmlns:p="http://schemas.openxmlformats.org/presentationml/2006/main" showMasterSp="0" showMasterPhAnim="0">
   <p:cSld>
     <p:spTree>
@@ -1047,7 +1050,7 @@
     </p:spTree>
     <p:extLst>
       <p:ext uri="{BB962C8B-B14F-4D97-AF65-F5344CB8AC3E}">
-        <p14:creationId xmlns:p14="http://schemas.microsoft.com/office/powerpoint/2010/main" val="138821827"/>
+        <p14:creationId xmlns:p14="http://schemas.microsoft.com/office/powerpoint/2010/main" val="1764306385"/>
       </p:ext>
     </p:extLst>
   </p:cSld>
@@ -1057,7 +1060,95 @@
 </p:notes>
 </file>
 
-<file path=ppt/notesSlides/notesSlide5.xml><?xml version="1.0" encoding="utf-8"?>
+<file path=ppt/notesSlides/notesSlide6.xml><?xml version="1.0" encoding="utf-8"?>
+<p:notes xmlns:a="http://schemas.openxmlformats.org/drawingml/2006/main" xmlns:r="http://schemas.openxmlformats.org/officeDocument/2006/relationships" xmlns:p="http://schemas.openxmlformats.org/presentationml/2006/main">
+  <p:cSld>
+    <p:spTree>
+      <p:nvGrpSpPr>
+        <p:cNvPr id="1" name=""/>
+        <p:cNvGrpSpPr/>
+        <p:nvPr/>
+      </p:nvGrpSpPr>
+      <p:grpSpPr>
+        <a:xfrm>
+          <a:off x="0" y="0"/>
+          <a:ext cx="0" cy="0"/>
+          <a:chOff x="0" y="0"/>
+          <a:chExt cx="0" cy="0"/>
+        </a:xfrm>
+      </p:grpSpPr>
+      <p:sp>
+        <p:nvSpPr>
+          <p:cNvPr id="2" name="Slide Image Placeholder 1"/>
+          <p:cNvSpPr>
+            <a:spLocks noGrp="1" noRot="1" noChangeAspect="1"/>
+          </p:cNvSpPr>
+          <p:nvPr>
+            <p:ph type="sldImg"/>
+          </p:nvPr>
+        </p:nvSpPr>
+        <p:spPr/>
+      </p:sp>
+      <p:sp>
+        <p:nvSpPr>
+          <p:cNvPr id="3" name="Notes Placeholder 2"/>
+          <p:cNvSpPr>
+            <a:spLocks noGrp="1"/>
+          </p:cNvSpPr>
+          <p:nvPr>
+            <p:ph type="body" idx="1"/>
+          </p:nvPr>
+        </p:nvSpPr>
+        <p:spPr/>
+        <p:txBody>
+          <a:bodyPr/>
+          <a:lstStyle/>
+          <a:p>
+            <a:r>
+              <a:rPr lang="en-US" smtClean="0"/>
+              <a:t>PAY IT FORWARD</a:t>
+            </a:r>
+            <a:endParaRPr lang="en-US"/>
+          </a:p>
+        </p:txBody>
+      </p:sp>
+      <p:sp>
+        <p:nvSpPr>
+          <p:cNvPr id="4" name="Slide Number Placeholder 3"/>
+          <p:cNvSpPr>
+            <a:spLocks noGrp="1"/>
+          </p:cNvSpPr>
+          <p:nvPr>
+            <p:ph type="sldNum" sz="quarter" idx="10"/>
+          </p:nvPr>
+        </p:nvSpPr>
+        <p:spPr/>
+        <p:txBody>
+          <a:bodyPr/>
+          <a:lstStyle/>
+          <a:p>
+            <a:fld id="{47510E77-FC52-4747-BB0B-6F848EB8C17D}" type="slidenum">
+              <a:rPr lang="en-US" smtClean="0"/>
+              <a:t>7</a:t>
+            </a:fld>
+            <a:endParaRPr lang="en-US"/>
+          </a:p>
+        </p:txBody>
+      </p:sp>
+    </p:spTree>
+    <p:extLst>
+      <p:ext uri="{BB962C8B-B14F-4D97-AF65-F5344CB8AC3E}">
+        <p14:creationId xmlns:p14="http://schemas.microsoft.com/office/powerpoint/2010/main" val="3151027850"/>
+      </p:ext>
+    </p:extLst>
+  </p:cSld>
+  <p:clrMapOvr>
+    <a:masterClrMapping/>
+  </p:clrMapOvr>
+</p:notes>
+</file>
+
+<file path=ppt/notesSlides/notesSlide7.xml><?xml version="1.0" encoding="utf-8"?>
 <p:notes xmlns:a="http://schemas.openxmlformats.org/drawingml/2006/main" xmlns:r="http://schemas.openxmlformats.org/officeDocument/2006/relationships" xmlns:p="http://schemas.openxmlformats.org/presentationml/2006/main" showMasterSp="0" showMasterPhAnim="0">
   <p:cSld>
     <p:spTree>
@@ -1161,11 +1252,6 @@
         </p:txBody>
       </p:sp>
     </p:spTree>
-    <p:extLst>
-      <p:ext uri="{BB962C8B-B14F-4D97-AF65-F5344CB8AC3E}">
-        <p14:creationId xmlns:p14="http://schemas.microsoft.com/office/powerpoint/2010/main" val="2189643892"/>
-      </p:ext>
-    </p:extLst>
   </p:cSld>
   <p:clrMapOvr>
     <a:masterClrMapping/>
@@ -1173,7 +1259,7 @@
 </p:notes>
 </file>
 
-<file path=ppt/notesSlides/notesSlide6.xml><?xml version="1.0" encoding="utf-8"?>
+<file path=ppt/notesSlides/notesSlide8.xml><?xml version="1.0" encoding="utf-8"?>
 <p:notes xmlns:a="http://schemas.openxmlformats.org/drawingml/2006/main" xmlns:r="http://schemas.openxmlformats.org/officeDocument/2006/relationships" xmlns:p="http://schemas.openxmlformats.org/presentationml/2006/main" showMasterSp="0" showMasterPhAnim="0">
   <p:cSld>
     <p:spTree>
@@ -1277,11 +1363,6 @@
         </p:txBody>
       </p:sp>
     </p:spTree>
-    <p:extLst>
-      <p:ext uri="{BB962C8B-B14F-4D97-AF65-F5344CB8AC3E}">
-        <p14:creationId xmlns:p14="http://schemas.microsoft.com/office/powerpoint/2010/main" val="3046462791"/>
-      </p:ext>
-    </p:extLst>
   </p:cSld>
   <p:clrMapOvr>
     <a:masterClrMapping/>
@@ -1289,7 +1370,7 @@
 </p:notes>
 </file>
 
-<file path=ppt/notesSlides/notesSlide7.xml><?xml version="1.0" encoding="utf-8"?>
+<file path=ppt/notesSlides/notesSlide9.xml><?xml version="1.0" encoding="utf-8"?>
 <p:notes xmlns:a="http://schemas.openxmlformats.org/drawingml/2006/main" xmlns:r="http://schemas.openxmlformats.org/officeDocument/2006/relationships" xmlns:p="http://schemas.openxmlformats.org/presentationml/2006/main" showMasterSp="0" showMasterPhAnim="0">
   <p:cSld>
     <p:spTree>
@@ -1393,233 +1474,6 @@
         </p:txBody>
       </p:sp>
     </p:spTree>
-    <p:extLst>
-      <p:ext uri="{BB962C8B-B14F-4D97-AF65-F5344CB8AC3E}">
-        <p14:creationId xmlns:p14="http://schemas.microsoft.com/office/powerpoint/2010/main" val="1764306385"/>
-      </p:ext>
-    </p:extLst>
-  </p:cSld>
-  <p:clrMapOvr>
-    <a:masterClrMapping/>
-  </p:clrMapOvr>
-</p:notes>
-</file>
-
-<file path=ppt/notesSlides/notesSlide8.xml><?xml version="1.0" encoding="utf-8"?>
-<p:notes xmlns:a="http://schemas.openxmlformats.org/drawingml/2006/main" xmlns:r="http://schemas.openxmlformats.org/officeDocument/2006/relationships" xmlns:p="http://schemas.openxmlformats.org/presentationml/2006/main" showMasterSp="0" showMasterPhAnim="0">
-  <p:cSld>
-    <p:spTree>
-      <p:nvGrpSpPr>
-        <p:cNvPr id="1" name="Shape 31"/>
-        <p:cNvGrpSpPr/>
-        <p:nvPr/>
-      </p:nvGrpSpPr>
-      <p:grpSpPr>
-        <a:xfrm>
-          <a:off x="0" y="0"/>
-          <a:ext cx="0" cy="0"/>
-          <a:chOff x="0" y="0"/>
-          <a:chExt cx="0" cy="0"/>
-        </a:xfrm>
-      </p:grpSpPr>
-      <p:sp>
-        <p:nvSpPr>
-          <p:cNvPr id="32" name="Shape 32"/>
-          <p:cNvSpPr>
-            <a:spLocks noGrp="1" noRot="1" noChangeAspect="1"/>
-          </p:cNvSpPr>
-          <p:nvPr>
-            <p:ph type="sldImg" idx="2"/>
-          </p:nvPr>
-        </p:nvSpPr>
-        <p:spPr>
-          <a:xfrm>
-            <a:off x="1143000" y="685800"/>
-            <a:ext cx="4572000" cy="3429000"/>
-          </a:xfrm>
-          <a:custGeom>
-            <a:avLst/>
-            <a:gdLst/>
-            <a:ahLst/>
-            <a:cxnLst/>
-            <a:rect l="0" t="0" r="0" b="0"/>
-            <a:pathLst>
-              <a:path w="120000" h="120000" extrusionOk="0">
-                <a:moveTo>
-                  <a:pt x="0" y="0"/>
-                </a:moveTo>
-                <a:lnTo>
-                  <a:pt x="120000" y="0"/>
-                </a:lnTo>
-                <a:lnTo>
-                  <a:pt x="120000" y="120000"/>
-                </a:lnTo>
-                <a:lnTo>
-                  <a:pt x="0" y="120000"/>
-                </a:lnTo>
-                <a:close/>
-              </a:path>
-            </a:pathLst>
-          </a:custGeom>
-          <a:noFill/>
-          <a:ln w="9525" cap="flat">
-            <a:solidFill>
-              <a:srgbClr val="000000"/>
-            </a:solidFill>
-            <a:prstDash val="solid"/>
-            <a:round/>
-            <a:headEnd type="none" w="med" len="med"/>
-            <a:tailEnd type="none" w="med" len="med"/>
-          </a:ln>
-        </p:spPr>
-      </p:sp>
-      <p:sp>
-        <p:nvSpPr>
-          <p:cNvPr id="33" name="Shape 33"/>
-          <p:cNvSpPr txBox="1">
-            <a:spLocks noGrp="1"/>
-          </p:cNvSpPr>
-          <p:nvPr>
-            <p:ph type="body" idx="1"/>
-          </p:nvPr>
-        </p:nvSpPr>
-        <p:spPr>
-          <a:xfrm>
-            <a:off x="685800" y="4343400"/>
-            <a:ext cx="5486399" cy="4114800"/>
-          </a:xfrm>
-          <a:prstGeom prst="rect">
-            <a:avLst/>
-          </a:prstGeom>
-        </p:spPr>
-        <p:txBody>
-          <a:bodyPr lIns="91425" tIns="91425" rIns="91425" bIns="91425" anchor="t" anchorCtr="0">
-            <a:noAutofit/>
-          </a:bodyPr>
-          <a:lstStyle/>
-          <a:p>
-            <a:pPr>
-              <a:spcBef>
-                <a:spcPts val="0"/>
-              </a:spcBef>
-              <a:buNone/>
-            </a:pPr>
-            <a:endParaRPr/>
-          </a:p>
-        </p:txBody>
-      </p:sp>
-    </p:spTree>
-  </p:cSld>
-  <p:clrMapOvr>
-    <a:masterClrMapping/>
-  </p:clrMapOvr>
-</p:notes>
-</file>
-
-<file path=ppt/notesSlides/notesSlide9.xml><?xml version="1.0" encoding="utf-8"?>
-<p:notes xmlns:a="http://schemas.openxmlformats.org/drawingml/2006/main" xmlns:r="http://schemas.openxmlformats.org/officeDocument/2006/relationships" xmlns:p="http://schemas.openxmlformats.org/presentationml/2006/main" showMasterSp="0" showMasterPhAnim="0">
-  <p:cSld>
-    <p:spTree>
-      <p:nvGrpSpPr>
-        <p:cNvPr id="1" name="Shape 31"/>
-        <p:cNvGrpSpPr/>
-        <p:nvPr/>
-      </p:nvGrpSpPr>
-      <p:grpSpPr>
-        <a:xfrm>
-          <a:off x="0" y="0"/>
-          <a:ext cx="0" cy="0"/>
-          <a:chOff x="0" y="0"/>
-          <a:chExt cx="0" cy="0"/>
-        </a:xfrm>
-      </p:grpSpPr>
-      <p:sp>
-        <p:nvSpPr>
-          <p:cNvPr id="32" name="Shape 32"/>
-          <p:cNvSpPr>
-            <a:spLocks noGrp="1" noRot="1" noChangeAspect="1"/>
-          </p:cNvSpPr>
-          <p:nvPr>
-            <p:ph type="sldImg" idx="2"/>
-          </p:nvPr>
-        </p:nvSpPr>
-        <p:spPr>
-          <a:xfrm>
-            <a:off x="1143000" y="685800"/>
-            <a:ext cx="4572000" cy="3429000"/>
-          </a:xfrm>
-          <a:custGeom>
-            <a:avLst/>
-            <a:gdLst/>
-            <a:ahLst/>
-            <a:cxnLst/>
-            <a:rect l="0" t="0" r="0" b="0"/>
-            <a:pathLst>
-              <a:path w="120000" h="120000" extrusionOk="0">
-                <a:moveTo>
-                  <a:pt x="0" y="0"/>
-                </a:moveTo>
-                <a:lnTo>
-                  <a:pt x="120000" y="0"/>
-                </a:lnTo>
-                <a:lnTo>
-                  <a:pt x="120000" y="120000"/>
-                </a:lnTo>
-                <a:lnTo>
-                  <a:pt x="0" y="120000"/>
-                </a:lnTo>
-                <a:close/>
-              </a:path>
-            </a:pathLst>
-          </a:custGeom>
-          <a:noFill/>
-          <a:ln w="9525" cap="flat">
-            <a:solidFill>
-              <a:srgbClr val="000000"/>
-            </a:solidFill>
-            <a:prstDash val="solid"/>
-            <a:round/>
-            <a:headEnd type="none" w="med" len="med"/>
-            <a:tailEnd type="none" w="med" len="med"/>
-          </a:ln>
-        </p:spPr>
-      </p:sp>
-      <p:sp>
-        <p:nvSpPr>
-          <p:cNvPr id="33" name="Shape 33"/>
-          <p:cNvSpPr txBox="1">
-            <a:spLocks noGrp="1"/>
-          </p:cNvSpPr>
-          <p:nvPr>
-            <p:ph type="body" idx="1"/>
-          </p:nvPr>
-        </p:nvSpPr>
-        <p:spPr>
-          <a:xfrm>
-            <a:off x="685800" y="4343400"/>
-            <a:ext cx="5486399" cy="4114800"/>
-          </a:xfrm>
-          <a:prstGeom prst="rect">
-            <a:avLst/>
-          </a:prstGeom>
-        </p:spPr>
-        <p:txBody>
-          <a:bodyPr lIns="91425" tIns="91425" rIns="91425" bIns="91425" anchor="t" anchorCtr="0">
-            <a:noAutofit/>
-          </a:bodyPr>
-          <a:lstStyle/>
-          <a:p>
-            <a:pPr>
-              <a:spcBef>
-                <a:spcPts val="0"/>
-              </a:spcBef>
-              <a:buNone/>
-            </a:pPr>
-            <a:endParaRPr/>
-          </a:p>
-        </p:txBody>
-      </p:sp>
-    </p:spTree>
   </p:cSld>
   <p:clrMapOvr>
     <a:masterClrMapping/>
@@ -1808,7 +1662,7 @@
           <a:p>
             <a:fld id="{7D246241-80F5-AC42-BC66-87EE2513DBA4}" type="datetimeFigureOut">
               <a:rPr lang="en-US" smtClean="0"/>
-              <a:t>5/30/18</a:t>
+              <a:t>6/7/18</a:t>
             </a:fld>
             <a:endParaRPr lang="en-US"/>
           </a:p>
@@ -1978,7 +1832,7 @@
           <a:p>
             <a:fld id="{7D246241-80F5-AC42-BC66-87EE2513DBA4}" type="datetimeFigureOut">
               <a:rPr lang="en-US" smtClean="0"/>
-              <a:t>5/30/18</a:t>
+              <a:t>6/7/18</a:t>
             </a:fld>
             <a:endParaRPr lang="en-US"/>
           </a:p>
@@ -2158,7 +2012,7 @@
           <a:p>
             <a:fld id="{7D246241-80F5-AC42-BC66-87EE2513DBA4}" type="datetimeFigureOut">
               <a:rPr lang="en-US" smtClean="0"/>
-              <a:t>5/30/18</a:t>
+              <a:t>6/7/18</a:t>
             </a:fld>
             <a:endParaRPr lang="en-US"/>
           </a:p>
@@ -2633,7 +2487,7 @@
           <a:p>
             <a:fld id="{7D246241-80F5-AC42-BC66-87EE2513DBA4}" type="datetimeFigureOut">
               <a:rPr lang="en-US" smtClean="0"/>
-              <a:t>5/30/18</a:t>
+              <a:t>6/7/18</a:t>
             </a:fld>
             <a:endParaRPr lang="en-US"/>
           </a:p>
@@ -2879,7 +2733,7 @@
           <a:p>
             <a:fld id="{7D246241-80F5-AC42-BC66-87EE2513DBA4}" type="datetimeFigureOut">
               <a:rPr lang="en-US" smtClean="0"/>
-              <a:t>5/30/18</a:t>
+              <a:t>6/7/18</a:t>
             </a:fld>
             <a:endParaRPr lang="en-US"/>
           </a:p>
@@ -3167,7 +3021,7 @@
           <a:p>
             <a:fld id="{7D246241-80F5-AC42-BC66-87EE2513DBA4}" type="datetimeFigureOut">
               <a:rPr lang="en-US" smtClean="0"/>
-              <a:t>5/30/18</a:t>
+              <a:t>6/7/18</a:t>
             </a:fld>
             <a:endParaRPr lang="en-US"/>
           </a:p>
@@ -3589,7 +3443,7 @@
           <a:p>
             <a:fld id="{7D246241-80F5-AC42-BC66-87EE2513DBA4}" type="datetimeFigureOut">
               <a:rPr lang="en-US" smtClean="0"/>
-              <a:t>5/30/18</a:t>
+              <a:t>6/7/18</a:t>
             </a:fld>
             <a:endParaRPr lang="en-US"/>
           </a:p>
@@ -3707,7 +3561,7 @@
           <a:p>
             <a:fld id="{7D246241-80F5-AC42-BC66-87EE2513DBA4}" type="datetimeFigureOut">
               <a:rPr lang="en-US" smtClean="0"/>
-              <a:t>5/30/18</a:t>
+              <a:t>6/7/18</a:t>
             </a:fld>
             <a:endParaRPr lang="en-US"/>
           </a:p>
@@ -3802,7 +3656,7 @@
           <a:p>
             <a:fld id="{7D246241-80F5-AC42-BC66-87EE2513DBA4}" type="datetimeFigureOut">
               <a:rPr lang="en-US" smtClean="0"/>
-              <a:t>5/30/18</a:t>
+              <a:t>6/7/18</a:t>
             </a:fld>
             <a:endParaRPr lang="en-US"/>
           </a:p>
@@ -4079,7 +3933,7 @@
           <a:p>
             <a:fld id="{7D246241-80F5-AC42-BC66-87EE2513DBA4}" type="datetimeFigureOut">
               <a:rPr lang="en-US" smtClean="0"/>
-              <a:t>5/30/18</a:t>
+              <a:t>6/7/18</a:t>
             </a:fld>
             <a:endParaRPr lang="en-US"/>
           </a:p>
@@ -4332,7 +4186,7 @@
           <a:p>
             <a:fld id="{7D246241-80F5-AC42-BC66-87EE2513DBA4}" type="datetimeFigureOut">
               <a:rPr lang="en-US" smtClean="0"/>
-              <a:t>5/30/18</a:t>
+              <a:t>6/7/18</a:t>
             </a:fld>
             <a:endParaRPr lang="en-US"/>
           </a:p>
@@ -4545,7 +4399,7 @@
           <a:p>
             <a:fld id="{7D246241-80F5-AC42-BC66-87EE2513DBA4}" type="datetimeFigureOut">
               <a:rPr lang="en-US" smtClean="0"/>
-              <a:t>5/30/18</a:t>
+              <a:t>6/7/18</a:t>
             </a:fld>
             <a:endParaRPr lang="en-US"/>
           </a:p>
@@ -5069,303 +4923,6 @@
   <p:cSld>
     <p:spTree>
       <p:nvGrpSpPr>
-        <p:cNvPr id="1" name=""/>
-        <p:cNvGrpSpPr/>
-        <p:nvPr/>
-      </p:nvGrpSpPr>
-      <p:grpSpPr>
-        <a:xfrm>
-          <a:off x="0" y="0"/>
-          <a:ext cx="0" cy="0"/>
-          <a:chOff x="0" y="0"/>
-          <a:chExt cx="0" cy="0"/>
-        </a:xfrm>
-      </p:grpSpPr>
-      <p:sp>
-        <p:nvSpPr>
-          <p:cNvPr id="2" name="Title 1"/>
-          <p:cNvSpPr>
-            <a:spLocks noGrp="1"/>
-          </p:cNvSpPr>
-          <p:nvPr>
-            <p:ph type="title"/>
-          </p:nvPr>
-        </p:nvSpPr>
-        <p:spPr/>
-        <p:txBody>
-          <a:bodyPr/>
-          <a:lstStyle/>
-          <a:p>
-            <a:endParaRPr lang="en-US"/>
-          </a:p>
-        </p:txBody>
-      </p:sp>
-      <p:sp>
-        <p:nvSpPr>
-          <p:cNvPr id="3" name="Text Placeholder 2"/>
-          <p:cNvSpPr>
-            <a:spLocks noGrp="1"/>
-          </p:cNvSpPr>
-          <p:nvPr>
-            <p:ph type="body" idx="1"/>
-          </p:nvPr>
-        </p:nvSpPr>
-        <p:spPr/>
-        <p:txBody>
-          <a:bodyPr/>
-          <a:lstStyle/>
-          <a:p>
-            <a:endParaRPr lang="en-US"/>
-          </a:p>
-        </p:txBody>
-      </p:sp>
-      <p:pic>
-        <p:nvPicPr>
-          <p:cNvPr id="4" name="Picture 3" descr="ten_thousand_2x.png"/>
-          <p:cNvPicPr>
-            <a:picLocks noChangeAspect="1"/>
-          </p:cNvPicPr>
-          <p:nvPr/>
-        </p:nvPicPr>
-        <p:blipFill>
-          <a:blip r:embed="rId2">
-            <a:extLst>
-              <a:ext uri="{28A0092B-C50C-407E-A947-70E740481C1C}">
-                <a14:useLocalDpi xmlns:a14="http://schemas.microsoft.com/office/drawing/2010/main" val="0"/>
-              </a:ext>
-            </a:extLst>
-          </a:blip>
-          <a:stretch>
-            <a:fillRect/>
-          </a:stretch>
-        </p:blipFill>
-        <p:spPr>
-          <a:xfrm>
-            <a:off x="298902" y="501650"/>
-            <a:ext cx="8546197" cy="5854700"/>
-          </a:xfrm>
-          <a:prstGeom prst="rect">
-            <a:avLst/>
-          </a:prstGeom>
-        </p:spPr>
-      </p:pic>
-    </p:spTree>
-    <p:extLst>
-      <p:ext uri="{BB962C8B-B14F-4D97-AF65-F5344CB8AC3E}">
-        <p14:creationId xmlns:p14="http://schemas.microsoft.com/office/powerpoint/2010/main" val="1415379485"/>
-      </p:ext>
-    </p:extLst>
-  </p:cSld>
-  <p:clrMapOvr>
-    <a:masterClrMapping/>
-  </p:clrMapOvr>
-</p:sld>
-</file>
-
-<file path=ppt/slides/slide11.xml><?xml version="1.0" encoding="utf-8"?>
-<p:sld xmlns:a="http://schemas.openxmlformats.org/drawingml/2006/main" xmlns:r="http://schemas.openxmlformats.org/officeDocument/2006/relationships" xmlns:p="http://schemas.openxmlformats.org/presentationml/2006/main">
-  <p:cSld>
-    <p:spTree>
-      <p:nvGrpSpPr>
-        <p:cNvPr id="1" name="Shape 28"/>
-        <p:cNvGrpSpPr/>
-        <p:nvPr/>
-      </p:nvGrpSpPr>
-      <p:grpSpPr>
-        <a:xfrm>
-          <a:off x="0" y="0"/>
-          <a:ext cx="0" cy="0"/>
-          <a:chOff x="0" y="0"/>
-          <a:chExt cx="0" cy="0"/>
-        </a:xfrm>
-      </p:grpSpPr>
-      <p:sp>
-        <p:nvSpPr>
-          <p:cNvPr id="29" name="Shape 29"/>
-          <p:cNvSpPr txBox="1">
-            <a:spLocks noGrp="1"/>
-          </p:cNvSpPr>
-          <p:nvPr>
-            <p:ph type="title"/>
-          </p:nvPr>
-        </p:nvSpPr>
-        <p:spPr>
-          <a:xfrm>
-            <a:off x="457200" y="274637"/>
-            <a:ext cx="8229600" cy="1143000"/>
-          </a:xfrm>
-          <a:prstGeom prst="rect">
-            <a:avLst/>
-          </a:prstGeom>
-        </p:spPr>
-        <p:txBody>
-          <a:bodyPr lIns="91425" tIns="91425" rIns="91425" bIns="91425" anchor="b" anchorCtr="0">
-            <a:noAutofit/>
-          </a:bodyPr>
-          <a:lstStyle/>
-          <a:p>
-            <a:pPr>
-              <a:spcBef>
-                <a:spcPts val="0"/>
-              </a:spcBef>
-              <a:buNone/>
-            </a:pPr>
-            <a:r>
-              <a:rPr lang="en-US" sz="7200" dirty="0" smtClean="0">
-                <a:solidFill>
-                  <a:srgbClr val="FF0000"/>
-                </a:solidFill>
-                <a:latin typeface="Yanone Kaffeesatz Bold"/>
-                <a:cs typeface="Yanone Kaffeesatz Bold"/>
-              </a:rPr>
-              <a:t>The plan…</a:t>
-            </a:r>
-            <a:endParaRPr lang="en" sz="7200" dirty="0">
-              <a:solidFill>
-                <a:srgbClr val="FF0000"/>
-              </a:solidFill>
-              <a:latin typeface="Yanone Kaffeesatz Bold"/>
-              <a:cs typeface="Yanone Kaffeesatz Bold"/>
-            </a:endParaRPr>
-          </a:p>
-        </p:txBody>
-      </p:sp>
-      <p:sp>
-        <p:nvSpPr>
-          <p:cNvPr id="30" name="Shape 30"/>
-          <p:cNvSpPr txBox="1">
-            <a:spLocks noGrp="1"/>
-          </p:cNvSpPr>
-          <p:nvPr>
-            <p:ph type="body" idx="1"/>
-          </p:nvPr>
-        </p:nvSpPr>
-        <p:spPr>
-          <a:xfrm>
-            <a:off x="457200" y="1610958"/>
-            <a:ext cx="8229600" cy="4967700"/>
-          </a:xfrm>
-          <a:prstGeom prst="rect">
-            <a:avLst/>
-          </a:prstGeom>
-        </p:spPr>
-        <p:txBody>
-          <a:bodyPr lIns="91425" tIns="91425" rIns="91425" bIns="91425" anchor="t" anchorCtr="0">
-            <a:noAutofit/>
-          </a:bodyPr>
-          <a:lstStyle/>
-          <a:p>
-            <a:pPr marL="457200" lvl="0" indent="-419100" rtl="0">
-              <a:lnSpc>
-                <a:spcPct val="130000"/>
-              </a:lnSpc>
-              <a:spcBef>
-                <a:spcPts val="0"/>
-              </a:spcBef>
-              <a:buClr>
-                <a:schemeClr val="dk1"/>
-              </a:buClr>
-              <a:buSzPct val="100000"/>
-              <a:buFont typeface="Arial"/>
-              <a:buChar char="●"/>
-            </a:pPr>
-            <a:r>
-              <a:rPr lang="en-US" dirty="0" smtClean="0"/>
-              <a:t>Work through Python in practice</a:t>
-            </a:r>
-          </a:p>
-          <a:p>
-            <a:pPr marL="457200" lvl="0" indent="-419100" rtl="0">
-              <a:lnSpc>
-                <a:spcPct val="130000"/>
-              </a:lnSpc>
-              <a:spcBef>
-                <a:spcPts val="0"/>
-              </a:spcBef>
-              <a:buClr>
-                <a:schemeClr val="dk1"/>
-              </a:buClr>
-              <a:buSzPct val="100000"/>
-              <a:buFont typeface="Arial"/>
-              <a:buChar char="●"/>
-            </a:pPr>
-            <a:r>
-              <a:rPr lang="en-US" dirty="0"/>
-              <a:t>Give some real-world examples of using Python</a:t>
-            </a:r>
-            <a:endParaRPr lang="en-US" dirty="0" smtClean="0"/>
-          </a:p>
-          <a:p>
-            <a:pPr marL="457200" lvl="0" indent="-419100" rtl="0">
-              <a:lnSpc>
-                <a:spcPct val="130000"/>
-              </a:lnSpc>
-              <a:spcBef>
-                <a:spcPts val="0"/>
-              </a:spcBef>
-              <a:buClr>
-                <a:schemeClr val="dk1"/>
-              </a:buClr>
-              <a:buSzPct val="100000"/>
-              <a:buFont typeface="Arial"/>
-              <a:buChar char="●"/>
-            </a:pPr>
-            <a:r>
-              <a:rPr lang="en-US" dirty="0"/>
-              <a:t>Discuss anything you want</a:t>
-            </a:r>
-          </a:p>
-          <a:p>
-            <a:pPr marL="457200" lvl="0" indent="-419100" rtl="0">
-              <a:lnSpc>
-                <a:spcPct val="130000"/>
-              </a:lnSpc>
-              <a:spcBef>
-                <a:spcPts val="0"/>
-              </a:spcBef>
-              <a:buClr>
-                <a:schemeClr val="dk1"/>
-              </a:buClr>
-              <a:buSzPct val="100000"/>
-              <a:buFont typeface="Arial"/>
-              <a:buChar char="●"/>
-            </a:pPr>
-            <a:r>
-              <a:rPr lang="en-US" dirty="0"/>
-              <a:t>Install on your own laptops</a:t>
-            </a:r>
-            <a:endParaRPr lang="en-US" dirty="0" smtClean="0"/>
-          </a:p>
-        </p:txBody>
-      </p:sp>
-    </p:spTree>
-    <p:extLst>
-      <p:ext uri="{BB962C8B-B14F-4D97-AF65-F5344CB8AC3E}">
-        <p14:creationId xmlns:p14="http://schemas.microsoft.com/office/powerpoint/2010/main" val="3323198116"/>
-      </p:ext>
-    </p:extLst>
-  </p:cSld>
-  <p:clrMapOvr>
-    <a:masterClrMapping/>
-  </p:clrMapOvr>
-  <p:transition xmlns:p14="http://schemas.microsoft.com/office/powerpoint/2010/main" spd="slow">
-    <p:cut/>
-  </p:transition>
-  <p:timing>
-    <p:tnLst>
-      <p:par>
-        <p:cTn xmlns:p14="http://schemas.microsoft.com/office/powerpoint/2010/main" id="1" dur="indefinite" restart="never" nodeType="tmRoot"/>
-      </p:par>
-    </p:tnLst>
-  </p:timing>
-</p:sld>
-</file>
-
-<file path=ppt/slides/slide12.xml><?xml version="1.0" encoding="utf-8"?>
-<p:sld xmlns:a="http://schemas.openxmlformats.org/drawingml/2006/main" xmlns:r="http://schemas.openxmlformats.org/officeDocument/2006/relationships" xmlns:p="http://schemas.openxmlformats.org/presentationml/2006/main">
-  <p:cSld>
-    <p:spTree>
-      <p:nvGrpSpPr>
         <p:cNvPr id="1" name="Shape 28"/>
         <p:cNvGrpSpPr/>
         <p:nvPr/>
@@ -5544,518 +5101,6 @@
 </file>
 
 <file path=ppt/slides/slide2.xml><?xml version="1.0" encoding="utf-8"?>
-<p:sld xmlns:a="http://schemas.openxmlformats.org/drawingml/2006/main" xmlns:r="http://schemas.openxmlformats.org/officeDocument/2006/relationships" xmlns:p="http://schemas.openxmlformats.org/presentationml/2006/main">
-  <p:cSld>
-    <p:spTree>
-      <p:nvGrpSpPr>
-        <p:cNvPr id="1" name="Shape 28"/>
-        <p:cNvGrpSpPr/>
-        <p:nvPr/>
-      </p:nvGrpSpPr>
-      <p:grpSpPr>
-        <a:xfrm>
-          <a:off x="0" y="0"/>
-          <a:ext cx="0" cy="0"/>
-          <a:chOff x="0" y="0"/>
-          <a:chExt cx="0" cy="0"/>
-        </a:xfrm>
-      </p:grpSpPr>
-      <p:sp>
-        <p:nvSpPr>
-          <p:cNvPr id="29" name="Shape 29"/>
-          <p:cNvSpPr txBox="1">
-            <a:spLocks noGrp="1"/>
-          </p:cNvSpPr>
-          <p:nvPr>
-            <p:ph type="title"/>
-          </p:nvPr>
-        </p:nvSpPr>
-        <p:spPr>
-          <a:xfrm>
-            <a:off x="457200" y="274637"/>
-            <a:ext cx="8229600" cy="1143000"/>
-          </a:xfrm>
-          <a:prstGeom prst="rect">
-            <a:avLst/>
-          </a:prstGeom>
-        </p:spPr>
-        <p:txBody>
-          <a:bodyPr lIns="91425" tIns="91425" rIns="91425" bIns="91425" anchor="b" anchorCtr="0">
-            <a:noAutofit/>
-          </a:bodyPr>
-          <a:lstStyle/>
-          <a:p>
-            <a:pPr>
-              <a:spcBef>
-                <a:spcPts val="0"/>
-              </a:spcBef>
-              <a:buNone/>
-            </a:pPr>
-            <a:r>
-              <a:rPr lang="en-US" sz="7200" dirty="0" smtClean="0">
-                <a:solidFill>
-                  <a:srgbClr val="FF0000"/>
-                </a:solidFill>
-                <a:latin typeface="Yanone Kaffeesatz Bold"/>
-                <a:cs typeface="Yanone Kaffeesatz Bold"/>
-              </a:rPr>
-              <a:t>Methods</a:t>
-            </a:r>
-            <a:endParaRPr lang="en" sz="7200" dirty="0">
-              <a:solidFill>
-                <a:srgbClr val="FF0000"/>
-              </a:solidFill>
-              <a:latin typeface="Yanone Kaffeesatz Bold"/>
-              <a:cs typeface="Yanone Kaffeesatz Bold"/>
-            </a:endParaRPr>
-          </a:p>
-        </p:txBody>
-      </p:sp>
-      <p:sp>
-        <p:nvSpPr>
-          <p:cNvPr id="30" name="Shape 30"/>
-          <p:cNvSpPr txBox="1">
-            <a:spLocks noGrp="1"/>
-          </p:cNvSpPr>
-          <p:nvPr>
-            <p:ph type="body" idx="1"/>
-          </p:nvPr>
-        </p:nvSpPr>
-        <p:spPr>
-          <a:xfrm>
-            <a:off x="457200" y="1600200"/>
-            <a:ext cx="8229600" cy="4967700"/>
-          </a:xfrm>
-          <a:prstGeom prst="rect">
-            <a:avLst/>
-          </a:prstGeom>
-        </p:spPr>
-        <p:txBody>
-          <a:bodyPr lIns="91425" tIns="91425" rIns="91425" bIns="91425" anchor="t" anchorCtr="0">
-            <a:noAutofit/>
-          </a:bodyPr>
-          <a:lstStyle/>
-          <a:p>
-            <a:pPr marL="38100" lvl="0" indent="0">
-              <a:lnSpc>
-                <a:spcPct val="130000"/>
-              </a:lnSpc>
-              <a:buClr>
-                <a:schemeClr val="dk1"/>
-              </a:buClr>
-              <a:buSzPct val="100000"/>
-              <a:buNone/>
-            </a:pPr>
-            <a:r>
-              <a:rPr lang="en-US" sz="2400" dirty="0" err="1" smtClean="0"/>
-              <a:t>def</a:t>
-            </a:r>
-            <a:r>
-              <a:rPr lang="en-US" sz="2400" dirty="0" smtClean="0"/>
-              <a:t> </a:t>
-            </a:r>
-            <a:r>
-              <a:rPr lang="en-US" sz="2400" dirty="0" err="1" smtClean="0"/>
-              <a:t>method_name</a:t>
-            </a:r>
-            <a:r>
-              <a:rPr lang="en-US" sz="2400" dirty="0" smtClean="0"/>
-              <a:t>(</a:t>
-            </a:r>
-            <a:r>
-              <a:rPr lang="en-US" sz="2400" dirty="0" err="1" smtClean="0"/>
-              <a:t>a_local_variable</a:t>
-            </a:r>
-            <a:r>
-              <a:rPr lang="en-US" sz="2400" dirty="0" smtClean="0"/>
-              <a:t>):</a:t>
-            </a:r>
-          </a:p>
-          <a:p>
-            <a:pPr marL="38100" lvl="0" indent="0">
-              <a:lnSpc>
-                <a:spcPct val="130000"/>
-              </a:lnSpc>
-              <a:buClr>
-                <a:schemeClr val="dk1"/>
-              </a:buClr>
-              <a:buSzPct val="100000"/>
-              <a:buNone/>
-            </a:pPr>
-            <a:r>
-              <a:rPr lang="en-US" sz="2400" dirty="0" smtClean="0"/>
-              <a:t>		</a:t>
-            </a:r>
-            <a:r>
-              <a:rPr lang="en-US" sz="2400" dirty="0" err="1" smtClean="0"/>
-              <a:t>a_local_variable</a:t>
-            </a:r>
-            <a:r>
-              <a:rPr lang="en-US" sz="2400" dirty="0" smtClean="0"/>
-              <a:t> exists here!</a:t>
-            </a:r>
-          </a:p>
-          <a:p>
-            <a:pPr marL="38100" lvl="0" indent="0">
-              <a:lnSpc>
-                <a:spcPct val="130000"/>
-              </a:lnSpc>
-              <a:buClr>
-                <a:schemeClr val="dk1"/>
-              </a:buClr>
-              <a:buSzPct val="100000"/>
-              <a:buNone/>
-            </a:pPr>
-            <a:endParaRPr lang="en-US" sz="2400" dirty="0"/>
-          </a:p>
-          <a:p>
-            <a:pPr marL="38100" lvl="0" indent="0">
-              <a:lnSpc>
-                <a:spcPct val="130000"/>
-              </a:lnSpc>
-              <a:buClr>
-                <a:schemeClr val="dk1"/>
-              </a:buClr>
-              <a:buSzPct val="100000"/>
-              <a:buNone/>
-            </a:pPr>
-            <a:r>
-              <a:rPr lang="en-US" sz="2400" dirty="0" err="1"/>
-              <a:t>m</a:t>
-            </a:r>
-            <a:r>
-              <a:rPr lang="en-US" sz="2400" dirty="0" err="1" smtClean="0"/>
-              <a:t>ethod_name</a:t>
-            </a:r>
-            <a:r>
-              <a:rPr lang="en-US" sz="2400" dirty="0" smtClean="0"/>
-              <a:t>(</a:t>
-            </a:r>
-            <a:r>
-              <a:rPr lang="en-US" sz="2400" dirty="0" err="1" smtClean="0"/>
-              <a:t>example_variable</a:t>
-            </a:r>
-            <a:r>
-              <a:rPr lang="en-US" sz="2400" dirty="0" smtClean="0"/>
-              <a:t>)</a:t>
-            </a:r>
-          </a:p>
-          <a:p>
-            <a:pPr marL="38100" lvl="0" indent="0">
-              <a:lnSpc>
-                <a:spcPct val="130000"/>
-              </a:lnSpc>
-              <a:buClr>
-                <a:schemeClr val="dk1"/>
-              </a:buClr>
-              <a:buSzPct val="100000"/>
-              <a:buNone/>
-            </a:pPr>
-            <a:endParaRPr lang="en-US" sz="2400" dirty="0" smtClean="0"/>
-          </a:p>
-          <a:p>
-            <a:pPr marL="38100" lvl="0" indent="0">
-              <a:lnSpc>
-                <a:spcPct val="130000"/>
-              </a:lnSpc>
-              <a:buClr>
-                <a:schemeClr val="dk1"/>
-              </a:buClr>
-              <a:buSzPct val="100000"/>
-              <a:buNone/>
-            </a:pPr>
-            <a:r>
-              <a:rPr lang="en-US" sz="2400" dirty="0" smtClean="0"/>
-              <a:t>Here, </a:t>
-            </a:r>
-            <a:r>
-              <a:rPr lang="en-US" sz="2400" dirty="0" err="1" smtClean="0"/>
-              <a:t>example_method</a:t>
-            </a:r>
-            <a:r>
-              <a:rPr lang="en-US" sz="2400" dirty="0" smtClean="0"/>
-              <a:t> gets passed to the function </a:t>
-            </a:r>
-            <a:r>
-              <a:rPr lang="en-US" sz="2400" dirty="0" err="1" smtClean="0"/>
-              <a:t>method_name</a:t>
-            </a:r>
-            <a:r>
-              <a:rPr lang="en-US" sz="2400" dirty="0" smtClean="0"/>
-              <a:t>. for the scope of that function, </a:t>
-            </a:r>
-            <a:r>
-              <a:rPr lang="en-US" sz="2400" dirty="0" err="1" smtClean="0"/>
-              <a:t>a_local_variable</a:t>
-            </a:r>
-            <a:r>
-              <a:rPr lang="en-US" sz="2400" dirty="0" smtClean="0"/>
-              <a:t> is set equal to </a:t>
-            </a:r>
-            <a:r>
-              <a:rPr lang="en-US" sz="2400" dirty="0" err="1" smtClean="0"/>
-              <a:t>example_method</a:t>
-            </a:r>
-            <a:endParaRPr lang="en-US" sz="2400" dirty="0"/>
-          </a:p>
-        </p:txBody>
-      </p:sp>
-    </p:spTree>
-    <p:extLst>
-      <p:ext uri="{BB962C8B-B14F-4D97-AF65-F5344CB8AC3E}">
-        <p14:creationId xmlns:p14="http://schemas.microsoft.com/office/powerpoint/2010/main" val="2484868750"/>
-      </p:ext>
-    </p:extLst>
-  </p:cSld>
-  <p:clrMapOvr>
-    <a:masterClrMapping/>
-  </p:clrMapOvr>
-  <p:transition xmlns:p14="http://schemas.microsoft.com/office/powerpoint/2010/main" spd="slow">
-    <p:cut/>
-  </p:transition>
-  <p:timing>
-    <p:tnLst>
-      <p:par>
-        <p:cTn xmlns:p14="http://schemas.microsoft.com/office/powerpoint/2010/main" id="1" dur="indefinite" restart="never" nodeType="tmRoot"/>
-      </p:par>
-    </p:tnLst>
-  </p:timing>
-</p:sld>
-</file>
-
-<file path=ppt/slides/slide3.xml><?xml version="1.0" encoding="utf-8"?>
-<p:sld xmlns:a="http://schemas.openxmlformats.org/drawingml/2006/main" xmlns:r="http://schemas.openxmlformats.org/officeDocument/2006/relationships" xmlns:p="http://schemas.openxmlformats.org/presentationml/2006/main">
-  <p:cSld>
-    <p:spTree>
-      <p:nvGrpSpPr>
-        <p:cNvPr id="1" name="Shape 28"/>
-        <p:cNvGrpSpPr/>
-        <p:nvPr/>
-      </p:nvGrpSpPr>
-      <p:grpSpPr>
-        <a:xfrm>
-          <a:off x="0" y="0"/>
-          <a:ext cx="0" cy="0"/>
-          <a:chOff x="0" y="0"/>
-          <a:chExt cx="0" cy="0"/>
-        </a:xfrm>
-      </p:grpSpPr>
-      <p:sp>
-        <p:nvSpPr>
-          <p:cNvPr id="29" name="Shape 29"/>
-          <p:cNvSpPr txBox="1">
-            <a:spLocks noGrp="1"/>
-          </p:cNvSpPr>
-          <p:nvPr>
-            <p:ph type="title"/>
-          </p:nvPr>
-        </p:nvSpPr>
-        <p:spPr>
-          <a:xfrm>
-            <a:off x="457200" y="274637"/>
-            <a:ext cx="8229600" cy="1143000"/>
-          </a:xfrm>
-          <a:prstGeom prst="rect">
-            <a:avLst/>
-          </a:prstGeom>
-        </p:spPr>
-        <p:txBody>
-          <a:bodyPr lIns="91425" tIns="91425" rIns="91425" bIns="91425" anchor="b" anchorCtr="0">
-            <a:noAutofit/>
-          </a:bodyPr>
-          <a:lstStyle/>
-          <a:p>
-            <a:pPr>
-              <a:spcBef>
-                <a:spcPts val="0"/>
-              </a:spcBef>
-              <a:buNone/>
-            </a:pPr>
-            <a:r>
-              <a:rPr lang="en-US" sz="7200" dirty="0" smtClean="0">
-                <a:solidFill>
-                  <a:srgbClr val="FF0000"/>
-                </a:solidFill>
-                <a:latin typeface="Yanone Kaffeesatz Bold"/>
-                <a:cs typeface="Yanone Kaffeesatz Bold"/>
-              </a:rPr>
-              <a:t>Methods</a:t>
-            </a:r>
-            <a:endParaRPr lang="en" sz="7200" dirty="0">
-              <a:solidFill>
-                <a:srgbClr val="FF0000"/>
-              </a:solidFill>
-              <a:latin typeface="Yanone Kaffeesatz Bold"/>
-              <a:cs typeface="Yanone Kaffeesatz Bold"/>
-            </a:endParaRPr>
-          </a:p>
-        </p:txBody>
-      </p:sp>
-      <p:sp>
-        <p:nvSpPr>
-          <p:cNvPr id="30" name="Shape 30"/>
-          <p:cNvSpPr txBox="1">
-            <a:spLocks noGrp="1"/>
-          </p:cNvSpPr>
-          <p:nvPr>
-            <p:ph type="body" idx="1"/>
-          </p:nvPr>
-        </p:nvSpPr>
-        <p:spPr>
-          <a:xfrm>
-            <a:off x="457200" y="1600200"/>
-            <a:ext cx="8229600" cy="4967700"/>
-          </a:xfrm>
-          <a:prstGeom prst="rect">
-            <a:avLst/>
-          </a:prstGeom>
-        </p:spPr>
-        <p:txBody>
-          <a:bodyPr lIns="91425" tIns="91425" rIns="91425" bIns="91425" anchor="t" anchorCtr="0">
-            <a:noAutofit/>
-          </a:bodyPr>
-          <a:lstStyle/>
-          <a:p>
-            <a:pPr marL="38100" lvl="0" indent="0">
-              <a:lnSpc>
-                <a:spcPct val="130000"/>
-              </a:lnSpc>
-              <a:buClr>
-                <a:schemeClr val="dk1"/>
-              </a:buClr>
-              <a:buSzPct val="100000"/>
-              <a:buNone/>
-            </a:pPr>
-            <a:r>
-              <a:rPr lang="en-US" sz="2400" dirty="0" err="1" smtClean="0"/>
-              <a:t>def</a:t>
-            </a:r>
-            <a:r>
-              <a:rPr lang="en-US" sz="2400" dirty="0" smtClean="0"/>
-              <a:t> </a:t>
-            </a:r>
-            <a:r>
-              <a:rPr lang="en-US" sz="2400" dirty="0" err="1" smtClean="0"/>
-              <a:t>method_name</a:t>
-            </a:r>
-            <a:r>
-              <a:rPr lang="en-US" sz="2400" dirty="0" smtClean="0"/>
-              <a:t>(</a:t>
-            </a:r>
-            <a:r>
-              <a:rPr lang="en-US" sz="2400" dirty="0" err="1" smtClean="0"/>
-              <a:t>a_local_variable</a:t>
-            </a:r>
-            <a:r>
-              <a:rPr lang="en-US" sz="2400" dirty="0" smtClean="0"/>
-              <a:t>):</a:t>
-            </a:r>
-          </a:p>
-          <a:p>
-            <a:pPr marL="38100" lvl="0" indent="0">
-              <a:lnSpc>
-                <a:spcPct val="130000"/>
-              </a:lnSpc>
-              <a:buClr>
-                <a:schemeClr val="dk1"/>
-              </a:buClr>
-              <a:buSzPct val="100000"/>
-              <a:buNone/>
-            </a:pPr>
-            <a:r>
-              <a:rPr lang="en-US" sz="2400" dirty="0" smtClean="0"/>
-              <a:t>		print(“a </a:t>
-            </a:r>
-            <a:r>
-              <a:rPr lang="en-US" sz="2400" smtClean="0"/>
-              <a:t>thing”)</a:t>
-            </a:r>
-            <a:endParaRPr lang="en-US" sz="2400" dirty="0" smtClean="0"/>
-          </a:p>
-          <a:p>
-            <a:pPr marL="38100" lvl="0" indent="0">
-              <a:lnSpc>
-                <a:spcPct val="130000"/>
-              </a:lnSpc>
-              <a:buClr>
-                <a:schemeClr val="dk1"/>
-              </a:buClr>
-              <a:buSzPct val="100000"/>
-              <a:buNone/>
-            </a:pPr>
-            <a:endParaRPr lang="en-US" sz="2400" dirty="0"/>
-          </a:p>
-          <a:p>
-            <a:pPr marL="38100" lvl="0" indent="0">
-              <a:lnSpc>
-                <a:spcPct val="130000"/>
-              </a:lnSpc>
-              <a:buClr>
-                <a:schemeClr val="dk1"/>
-              </a:buClr>
-              <a:buSzPct val="100000"/>
-              <a:buNone/>
-            </a:pPr>
-            <a:r>
-              <a:rPr lang="en-US" sz="2400" dirty="0" err="1"/>
-              <a:t>m</a:t>
-            </a:r>
-            <a:r>
-              <a:rPr lang="en-US" sz="2400" dirty="0" err="1" smtClean="0"/>
-              <a:t>ethod_name</a:t>
-            </a:r>
-            <a:r>
-              <a:rPr lang="en-US" sz="2400" dirty="0" smtClean="0"/>
-              <a:t>(</a:t>
-            </a:r>
-            <a:r>
-              <a:rPr lang="en-US" sz="2400" dirty="0" err="1" smtClean="0"/>
-              <a:t>example_method</a:t>
-            </a:r>
-            <a:r>
-              <a:rPr lang="en-US" sz="2400" dirty="0" smtClean="0"/>
-              <a:t>)</a:t>
-            </a:r>
-          </a:p>
-          <a:p>
-            <a:pPr marL="38100" lvl="0" indent="0">
-              <a:lnSpc>
-                <a:spcPct val="130000"/>
-              </a:lnSpc>
-              <a:buClr>
-                <a:schemeClr val="dk1"/>
-              </a:buClr>
-              <a:buSzPct val="100000"/>
-              <a:buNone/>
-            </a:pPr>
-            <a:endParaRPr lang="en-US" sz="2400" dirty="0" smtClean="0"/>
-          </a:p>
-        </p:txBody>
-      </p:sp>
-    </p:spTree>
-    <p:extLst>
-      <p:ext uri="{BB962C8B-B14F-4D97-AF65-F5344CB8AC3E}">
-        <p14:creationId xmlns:p14="http://schemas.microsoft.com/office/powerpoint/2010/main" val="607769909"/>
-      </p:ext>
-    </p:extLst>
-  </p:cSld>
-  <p:clrMapOvr>
-    <a:masterClrMapping/>
-  </p:clrMapOvr>
-  <p:transition xmlns:p14="http://schemas.microsoft.com/office/powerpoint/2010/main" spd="slow">
-    <p:cut/>
-  </p:transition>
-  <p:timing>
-    <p:tnLst>
-      <p:par>
-        <p:cTn xmlns:p14="http://schemas.microsoft.com/office/powerpoint/2010/main" id="1" dur="indefinite" restart="never" nodeType="tmRoot"/>
-      </p:par>
-    </p:tnLst>
-  </p:timing>
-</p:sld>
-</file>
-
-<file path=ppt/slides/slide4.xml><?xml version="1.0" encoding="utf-8"?>
 <p:sld xmlns:a="http://schemas.openxmlformats.org/drawingml/2006/main" xmlns:r="http://schemas.openxmlformats.org/officeDocument/2006/relationships" xmlns:p="http://schemas.openxmlformats.org/presentationml/2006/main">
   <p:cSld>
     <p:spTree>
@@ -6170,7 +5215,7 @@
 </p:sld>
 </file>
 
-<file path=ppt/slides/slide5.xml><?xml version="1.0" encoding="utf-8"?>
+<file path=ppt/slides/slide3.xml><?xml version="1.0" encoding="utf-8"?>
 <p:sld xmlns:a="http://schemas.openxmlformats.org/drawingml/2006/main" xmlns:r="http://schemas.openxmlformats.org/officeDocument/2006/relationships" xmlns:p="http://schemas.openxmlformats.org/presentationml/2006/main">
   <p:cSld>
     <p:spTree>
@@ -6269,6 +5314,328 @@
 </p:sld>
 </file>
 
+<file path=ppt/slides/slide4.xml><?xml version="1.0" encoding="utf-8"?>
+<p:sld xmlns:a="http://schemas.openxmlformats.org/drawingml/2006/main" xmlns:r="http://schemas.openxmlformats.org/officeDocument/2006/relationships" xmlns:p="http://schemas.openxmlformats.org/presentationml/2006/main">
+  <p:cSld>
+    <p:spTree>
+      <p:nvGrpSpPr>
+        <p:cNvPr id="1" name="Shape 28"/>
+        <p:cNvGrpSpPr/>
+        <p:nvPr/>
+      </p:nvGrpSpPr>
+      <p:grpSpPr>
+        <a:xfrm>
+          <a:off x="0" y="0"/>
+          <a:ext cx="0" cy="0"/>
+          <a:chOff x="0" y="0"/>
+          <a:chExt cx="0" cy="0"/>
+        </a:xfrm>
+      </p:grpSpPr>
+      <p:sp>
+        <p:nvSpPr>
+          <p:cNvPr id="29" name="Shape 29"/>
+          <p:cNvSpPr txBox="1">
+            <a:spLocks noGrp="1"/>
+          </p:cNvSpPr>
+          <p:nvPr>
+            <p:ph type="title"/>
+          </p:nvPr>
+        </p:nvSpPr>
+        <p:spPr>
+          <a:xfrm>
+            <a:off x="457200" y="274637"/>
+            <a:ext cx="8229600" cy="1143000"/>
+          </a:xfrm>
+          <a:prstGeom prst="rect">
+            <a:avLst/>
+          </a:prstGeom>
+        </p:spPr>
+        <p:txBody>
+          <a:bodyPr lIns="91425" tIns="91425" rIns="91425" bIns="91425" anchor="b" anchorCtr="0">
+            <a:noAutofit/>
+          </a:bodyPr>
+          <a:lstStyle/>
+          <a:p>
+            <a:pPr>
+              <a:spcBef>
+                <a:spcPts val="0"/>
+              </a:spcBef>
+              <a:buNone/>
+            </a:pPr>
+            <a:r>
+              <a:rPr lang="en-US" sz="5400" dirty="0" smtClean="0">
+                <a:solidFill>
+                  <a:srgbClr val="FF0000"/>
+                </a:solidFill>
+                <a:latin typeface="Yanone Kaffeesatz Bold"/>
+                <a:cs typeface="Yanone Kaffeesatz Bold"/>
+              </a:rPr>
+              <a:t>Dunning-Kruger Effect</a:t>
+            </a:r>
+            <a:endParaRPr lang="en" sz="5400" dirty="0">
+              <a:solidFill>
+                <a:srgbClr val="FF0000"/>
+              </a:solidFill>
+              <a:latin typeface="Yanone Kaffeesatz Bold"/>
+              <a:cs typeface="Yanone Kaffeesatz Bold"/>
+            </a:endParaRPr>
+          </a:p>
+        </p:txBody>
+      </p:sp>
+      <p:sp>
+        <p:nvSpPr>
+          <p:cNvPr id="30" name="Shape 30"/>
+          <p:cNvSpPr txBox="1">
+            <a:spLocks noGrp="1"/>
+          </p:cNvSpPr>
+          <p:nvPr>
+            <p:ph type="body" idx="1"/>
+          </p:nvPr>
+        </p:nvSpPr>
+        <p:spPr>
+          <a:xfrm>
+            <a:off x="457200" y="1600200"/>
+            <a:ext cx="8229600" cy="4967700"/>
+          </a:xfrm>
+          <a:prstGeom prst="rect">
+            <a:avLst/>
+          </a:prstGeom>
+        </p:spPr>
+        <p:txBody>
+          <a:bodyPr lIns="91425" tIns="91425" rIns="91425" bIns="91425" anchor="t" anchorCtr="0">
+            <a:noAutofit/>
+          </a:bodyPr>
+          <a:lstStyle/>
+          <a:p>
+            <a:pPr marL="457200" lvl="0" indent="-419100">
+              <a:lnSpc>
+                <a:spcPct val="130000"/>
+              </a:lnSpc>
+              <a:buClr>
+                <a:schemeClr val="dk1"/>
+              </a:buClr>
+              <a:buSzPct val="100000"/>
+              <a:buFont typeface="Arial"/>
+              <a:buChar char="●"/>
+            </a:pPr>
+            <a:r>
+              <a:rPr lang="en-US" dirty="0" smtClean="0"/>
+              <a:t>Cognitive bias of unskilled individuals suffering from illusory superiority</a:t>
+            </a:r>
+          </a:p>
+          <a:p>
+            <a:pPr marL="457200" lvl="0" indent="-419100">
+              <a:lnSpc>
+                <a:spcPct val="130000"/>
+              </a:lnSpc>
+              <a:buClr>
+                <a:schemeClr val="dk1"/>
+              </a:buClr>
+              <a:buSzPct val="100000"/>
+              <a:buFont typeface="Arial"/>
+              <a:buChar char="●"/>
+            </a:pPr>
+            <a:r>
+              <a:rPr lang="en-US" dirty="0" smtClean="0"/>
+              <a:t>Rate their ability much higher than accurate</a:t>
+            </a:r>
+            <a:endParaRPr lang="en-US" dirty="0"/>
+          </a:p>
+        </p:txBody>
+      </p:sp>
+    </p:spTree>
+    <p:extLst>
+      <p:ext uri="{BB962C8B-B14F-4D97-AF65-F5344CB8AC3E}">
+        <p14:creationId xmlns:p14="http://schemas.microsoft.com/office/powerpoint/2010/main" val="636634460"/>
+      </p:ext>
+    </p:extLst>
+  </p:cSld>
+  <p:clrMapOvr>
+    <a:masterClrMapping/>
+  </p:clrMapOvr>
+  <p:transition xmlns:p14="http://schemas.microsoft.com/office/powerpoint/2010/main" spd="slow">
+    <p:cut/>
+  </p:transition>
+  <p:timing>
+    <p:tnLst>
+      <p:par>
+        <p:cTn xmlns:p14="http://schemas.microsoft.com/office/powerpoint/2010/main" id="1" dur="indefinite" restart="never" nodeType="tmRoot"/>
+      </p:par>
+    </p:tnLst>
+  </p:timing>
+</p:sld>
+</file>
+
+<file path=ppt/slides/slide5.xml><?xml version="1.0" encoding="utf-8"?>
+<p:sld xmlns:a="http://schemas.openxmlformats.org/drawingml/2006/main" xmlns:r="http://schemas.openxmlformats.org/officeDocument/2006/relationships" xmlns:p="http://schemas.openxmlformats.org/presentationml/2006/main">
+  <p:cSld>
+    <p:spTree>
+      <p:nvGrpSpPr>
+        <p:cNvPr id="1" name="Shape 28"/>
+        <p:cNvGrpSpPr/>
+        <p:nvPr/>
+      </p:nvGrpSpPr>
+      <p:grpSpPr>
+        <a:xfrm>
+          <a:off x="0" y="0"/>
+          <a:ext cx="0" cy="0"/>
+          <a:chOff x="0" y="0"/>
+          <a:chExt cx="0" cy="0"/>
+        </a:xfrm>
+      </p:grpSpPr>
+      <p:sp>
+        <p:nvSpPr>
+          <p:cNvPr id="29" name="Shape 29"/>
+          <p:cNvSpPr txBox="1">
+            <a:spLocks noGrp="1"/>
+          </p:cNvSpPr>
+          <p:nvPr>
+            <p:ph type="title"/>
+          </p:nvPr>
+        </p:nvSpPr>
+        <p:spPr>
+          <a:xfrm>
+            <a:off x="457200" y="274637"/>
+            <a:ext cx="8229600" cy="1143000"/>
+          </a:xfrm>
+          <a:prstGeom prst="rect">
+            <a:avLst/>
+          </a:prstGeom>
+        </p:spPr>
+        <p:txBody>
+          <a:bodyPr lIns="91425" tIns="91425" rIns="91425" bIns="91425" anchor="b" anchorCtr="0">
+            <a:noAutofit/>
+          </a:bodyPr>
+          <a:lstStyle/>
+          <a:p>
+            <a:pPr>
+              <a:spcBef>
+                <a:spcPts val="0"/>
+              </a:spcBef>
+              <a:buNone/>
+            </a:pPr>
+            <a:r>
+              <a:rPr lang="en-US" sz="6600" dirty="0" smtClean="0">
+                <a:solidFill>
+                  <a:srgbClr val="FF0000"/>
+                </a:solidFill>
+                <a:latin typeface="Yanone Kaffeesatz Bold"/>
+                <a:cs typeface="Yanone Kaffeesatz Bold"/>
+              </a:rPr>
+              <a:t>Impostor Syndrome</a:t>
+            </a:r>
+            <a:endParaRPr lang="en" sz="6600" dirty="0">
+              <a:solidFill>
+                <a:srgbClr val="FF0000"/>
+              </a:solidFill>
+              <a:latin typeface="Yanone Kaffeesatz Bold"/>
+              <a:cs typeface="Yanone Kaffeesatz Bold"/>
+            </a:endParaRPr>
+          </a:p>
+        </p:txBody>
+      </p:sp>
+      <p:sp>
+        <p:nvSpPr>
+          <p:cNvPr id="30" name="Shape 30"/>
+          <p:cNvSpPr txBox="1">
+            <a:spLocks noGrp="1"/>
+          </p:cNvSpPr>
+          <p:nvPr>
+            <p:ph type="body" idx="1"/>
+          </p:nvPr>
+        </p:nvSpPr>
+        <p:spPr>
+          <a:xfrm>
+            <a:off x="457200" y="1600200"/>
+            <a:ext cx="8229600" cy="4967700"/>
+          </a:xfrm>
+          <a:prstGeom prst="rect">
+            <a:avLst/>
+          </a:prstGeom>
+        </p:spPr>
+        <p:txBody>
+          <a:bodyPr lIns="91425" tIns="91425" rIns="91425" bIns="91425" anchor="t" anchorCtr="0">
+            <a:noAutofit/>
+          </a:bodyPr>
+          <a:lstStyle/>
+          <a:p>
+            <a:pPr marL="457200" lvl="0" indent="-419100">
+              <a:lnSpc>
+                <a:spcPct val="130000"/>
+              </a:lnSpc>
+              <a:buClr>
+                <a:schemeClr val="dk1"/>
+              </a:buClr>
+              <a:buSzPct val="100000"/>
+              <a:buFont typeface="Arial"/>
+              <a:buChar char="●"/>
+            </a:pPr>
+            <a:r>
+              <a:rPr lang="en-US" dirty="0" smtClean="0"/>
+              <a:t>Your accomplishments are undeserved, invalid, you in some way not earned</a:t>
+            </a:r>
+          </a:p>
+          <a:p>
+            <a:pPr marL="457200" lvl="0" indent="-419100">
+              <a:lnSpc>
+                <a:spcPct val="130000"/>
+              </a:lnSpc>
+              <a:buClr>
+                <a:schemeClr val="dk1"/>
+              </a:buClr>
+              <a:buSzPct val="100000"/>
+              <a:buFont typeface="Arial"/>
+              <a:buChar char="●"/>
+            </a:pPr>
+            <a:r>
+              <a:rPr lang="en-US" dirty="0" smtClean="0"/>
+              <a:t>(not a </a:t>
+            </a:r>
+            <a:r>
+              <a:rPr lang="en-US" smtClean="0"/>
+              <a:t>descriptive slide)</a:t>
+            </a:r>
+            <a:endParaRPr lang="en-US" dirty="0" smtClean="0"/>
+          </a:p>
+          <a:p>
+            <a:pPr marL="457200" lvl="0" indent="-419100">
+              <a:lnSpc>
+                <a:spcPct val="130000"/>
+              </a:lnSpc>
+              <a:buClr>
+                <a:schemeClr val="dk1"/>
+              </a:buClr>
+              <a:buSzPct val="100000"/>
+              <a:buFont typeface="Arial"/>
+              <a:buChar char="●"/>
+            </a:pPr>
+            <a:endParaRPr lang="en-US" dirty="0"/>
+          </a:p>
+        </p:txBody>
+      </p:sp>
+    </p:spTree>
+    <p:extLst>
+      <p:ext uri="{BB962C8B-B14F-4D97-AF65-F5344CB8AC3E}">
+        <p14:creationId xmlns:p14="http://schemas.microsoft.com/office/powerpoint/2010/main" val="3893215902"/>
+      </p:ext>
+    </p:extLst>
+  </p:cSld>
+  <p:clrMapOvr>
+    <a:masterClrMapping/>
+  </p:clrMapOvr>
+  <p:transition xmlns:p14="http://schemas.microsoft.com/office/powerpoint/2010/main" spd="slow">
+    <p:cut/>
+  </p:transition>
+  <p:timing>
+    <p:tnLst>
+      <p:par>
+        <p:cTn xmlns:p14="http://schemas.microsoft.com/office/powerpoint/2010/main" id="1" dur="indefinite" restart="never" nodeType="tmRoot"/>
+      </p:par>
+    </p:tnLst>
+  </p:timing>
+</p:sld>
+</file>
+
 <file path=ppt/slides/slide6.xml><?xml version="1.0" encoding="utf-8"?>
 <p:sld xmlns:a="http://schemas.openxmlformats.org/drawingml/2006/main" xmlns:r="http://schemas.openxmlformats.org/officeDocument/2006/relationships" xmlns:p="http://schemas.openxmlformats.org/presentationml/2006/main">
   <p:cSld>
@@ -6318,16 +5685,16 @@
               <a:buNone/>
             </a:pPr>
             <a:r>
-              <a:rPr lang="en-US" sz="5400" dirty="0" smtClean="0">
+              <a:rPr lang="en-US" sz="7200" dirty="0" smtClean="0">
                 <a:solidFill>
                   <a:srgbClr val="FF0000"/>
                 </a:solidFill>
                 <a:latin typeface="Yanone Kaffeesatz Bold"/>
                 <a:cs typeface="Yanone Kaffeesatz Bold"/>
               </a:rPr>
-              <a:t>Dunning-Kruger Effect</a:t>
-            </a:r>
-            <a:endParaRPr lang="en" sz="5400" dirty="0">
+              <a:t>Reading</a:t>
+            </a:r>
+            <a:endParaRPr lang="en" sz="7200" dirty="0">
               <a:solidFill>
                 <a:srgbClr val="FF0000"/>
               </a:solidFill>
@@ -6361,6 +5728,47 @@
             <a:noAutofit/>
           </a:bodyPr>
           <a:lstStyle/>
+          <a:p>
+            <a:pPr marL="38100" lvl="0" indent="0">
+              <a:lnSpc>
+                <a:spcPct val="130000"/>
+              </a:lnSpc>
+              <a:buClr>
+                <a:schemeClr val="dk1"/>
+              </a:buClr>
+              <a:buSzPct val="100000"/>
+              <a:buNone/>
+            </a:pPr>
+            <a:r>
+              <a:rPr lang="en-US" dirty="0" smtClean="0"/>
+              <a:t>Tanya X Short, “Overcoming Impostor’s </a:t>
+            </a:r>
+            <a:r>
+              <a:rPr lang="en-US" dirty="0"/>
+              <a:t>Syndrome” http://</a:t>
+            </a:r>
+            <a:r>
+              <a:rPr lang="en-US" dirty="0" err="1"/>
+              <a:t>www.gamasutra.com</a:t>
+            </a:r>
+            <a:r>
+              <a:rPr lang="en-US" dirty="0"/>
+              <a:t>/blogs/</a:t>
+            </a:r>
+            <a:r>
+              <a:rPr lang="en-US" dirty="0" err="1"/>
+              <a:t>TanyaXShort</a:t>
+            </a:r>
+            <a:r>
+              <a:rPr lang="en-US" dirty="0"/>
+              <a:t>/20140716/220938/</a:t>
+            </a:r>
+            <a:r>
+              <a:rPr lang="en-US" dirty="0" err="1"/>
+              <a:t>Overcoming_Impostors_Syndrome.php</a:t>
+            </a:r>
+            <a:endParaRPr lang="en-US" dirty="0" smtClean="0"/>
+          </a:p>
           <a:p>
             <a:pPr marL="457200" lvl="0" indent="-419100">
               <a:lnSpc>
@@ -6373,27 +5781,6 @@
               <a:buFont typeface="Arial"/>
               <a:buChar char="●"/>
             </a:pPr>
-            <a:r>
-              <a:rPr lang="en-US" dirty="0" smtClean="0"/>
-              <a:t>Cognitive bias of unskilled individuals suffering from illusory superiority</a:t>
-            </a:r>
-          </a:p>
-          <a:p>
-            <a:pPr marL="457200" lvl="0" indent="-419100">
-              <a:lnSpc>
-                <a:spcPct val="130000"/>
-              </a:lnSpc>
-              <a:buClr>
-                <a:schemeClr val="dk1"/>
-              </a:buClr>
-              <a:buSzPct val="100000"/>
-              <a:buFont typeface="Arial"/>
-              <a:buChar char="●"/>
-            </a:pPr>
-            <a:r>
-              <a:rPr lang="en-US" dirty="0" smtClean="0"/>
-              <a:t>Rate their ability much higher than accurate</a:t>
-            </a:r>
             <a:endParaRPr lang="en-US" dirty="0"/>
           </a:p>
         </p:txBody>
@@ -6401,7 +5788,7 @@
     </p:spTree>
     <p:extLst>
       <p:ext uri="{BB962C8B-B14F-4D97-AF65-F5344CB8AC3E}">
-        <p14:creationId xmlns:p14="http://schemas.microsoft.com/office/powerpoint/2010/main" val="636634460"/>
+        <p14:creationId xmlns:p14="http://schemas.microsoft.com/office/powerpoint/2010/main" val="3547598800"/>
       </p:ext>
     </p:extLst>
   </p:cSld>
@@ -6426,7 +5813,7 @@
   <p:cSld>
     <p:spTree>
       <p:nvGrpSpPr>
-        <p:cNvPr id="1" name="Shape 28"/>
+        <p:cNvPr id="1" name=""/>
         <p:cNvGrpSpPr/>
         <p:nvPr/>
       </p:nvGrpSpPr>
@@ -6440,154 +5827,82 @@
       </p:grpSpPr>
       <p:sp>
         <p:nvSpPr>
-          <p:cNvPr id="29" name="Shape 29"/>
-          <p:cNvSpPr txBox="1">
+          <p:cNvPr id="2" name="Title 1"/>
+          <p:cNvSpPr>
             <a:spLocks noGrp="1"/>
           </p:cNvSpPr>
           <p:nvPr>
             <p:ph type="title"/>
           </p:nvPr>
         </p:nvSpPr>
+        <p:spPr/>
+        <p:txBody>
+          <a:bodyPr/>
+          <a:lstStyle/>
+          <a:p>
+            <a:endParaRPr lang="en-US"/>
+          </a:p>
+        </p:txBody>
+      </p:sp>
+      <p:sp>
+        <p:nvSpPr>
+          <p:cNvPr id="3" name="Text Placeholder 2"/>
+          <p:cNvSpPr>
+            <a:spLocks noGrp="1"/>
+          </p:cNvSpPr>
+          <p:nvPr>
+            <p:ph type="body" idx="1"/>
+          </p:nvPr>
+        </p:nvSpPr>
+        <p:spPr/>
+        <p:txBody>
+          <a:bodyPr/>
+          <a:lstStyle/>
+          <a:p>
+            <a:endParaRPr lang="en-US"/>
+          </a:p>
+        </p:txBody>
+      </p:sp>
+      <p:pic>
+        <p:nvPicPr>
+          <p:cNvPr id="4" name="Picture 3" descr="ten_thousand_2x.png"/>
+          <p:cNvPicPr>
+            <a:picLocks noChangeAspect="1"/>
+          </p:cNvPicPr>
+          <p:nvPr/>
+        </p:nvPicPr>
+        <p:blipFill>
+          <a:blip r:embed="rId3">
+            <a:extLst>
+              <a:ext uri="{28A0092B-C50C-407E-A947-70E740481C1C}">
+                <a14:useLocalDpi xmlns:a14="http://schemas.microsoft.com/office/drawing/2010/main" val="0"/>
+              </a:ext>
+            </a:extLst>
+          </a:blip>
+          <a:stretch>
+            <a:fillRect/>
+          </a:stretch>
+        </p:blipFill>
         <p:spPr>
           <a:xfrm>
-            <a:off x="457200" y="274637"/>
-            <a:ext cx="8229600" cy="1143000"/>
+            <a:off x="298902" y="501650"/>
+            <a:ext cx="8546197" cy="5854700"/>
           </a:xfrm>
           <a:prstGeom prst="rect">
             <a:avLst/>
           </a:prstGeom>
         </p:spPr>
-        <p:txBody>
-          <a:bodyPr lIns="91425" tIns="91425" rIns="91425" bIns="91425" anchor="b" anchorCtr="0">
-            <a:noAutofit/>
-          </a:bodyPr>
-          <a:lstStyle/>
-          <a:p>
-            <a:pPr>
-              <a:spcBef>
-                <a:spcPts val="0"/>
-              </a:spcBef>
-              <a:buNone/>
-            </a:pPr>
-            <a:r>
-              <a:rPr lang="en-US" sz="6600" dirty="0" smtClean="0">
-                <a:solidFill>
-                  <a:srgbClr val="FF0000"/>
-                </a:solidFill>
-                <a:latin typeface="Yanone Kaffeesatz Bold"/>
-                <a:cs typeface="Yanone Kaffeesatz Bold"/>
-              </a:rPr>
-              <a:t>Impostor Syndrome</a:t>
-            </a:r>
-            <a:endParaRPr lang="en" sz="6600" dirty="0">
-              <a:solidFill>
-                <a:srgbClr val="FF0000"/>
-              </a:solidFill>
-              <a:latin typeface="Yanone Kaffeesatz Bold"/>
-              <a:cs typeface="Yanone Kaffeesatz Bold"/>
-            </a:endParaRPr>
-          </a:p>
-        </p:txBody>
-      </p:sp>
-      <p:sp>
-        <p:nvSpPr>
-          <p:cNvPr id="30" name="Shape 30"/>
-          <p:cNvSpPr txBox="1">
-            <a:spLocks noGrp="1"/>
-          </p:cNvSpPr>
-          <p:nvPr>
-            <p:ph type="body" idx="1"/>
-          </p:nvPr>
-        </p:nvSpPr>
-        <p:spPr>
-          <a:xfrm>
-            <a:off x="457200" y="1600200"/>
-            <a:ext cx="8229600" cy="4967700"/>
-          </a:xfrm>
-          <a:prstGeom prst="rect">
-            <a:avLst/>
-          </a:prstGeom>
-        </p:spPr>
-        <p:txBody>
-          <a:bodyPr lIns="91425" tIns="91425" rIns="91425" bIns="91425" anchor="t" anchorCtr="0">
-            <a:noAutofit/>
-          </a:bodyPr>
-          <a:lstStyle/>
-          <a:p>
-            <a:pPr marL="457200" lvl="0" indent="-419100">
-              <a:lnSpc>
-                <a:spcPct val="130000"/>
-              </a:lnSpc>
-              <a:buClr>
-                <a:schemeClr val="dk1"/>
-              </a:buClr>
-              <a:buSzPct val="100000"/>
-              <a:buFont typeface="Arial"/>
-              <a:buChar char="●"/>
-            </a:pPr>
-            <a:r>
-              <a:rPr lang="en-US" dirty="0" smtClean="0"/>
-              <a:t>Your accomplishments are undeserved, invalid, you in some way not earned</a:t>
-            </a:r>
-          </a:p>
-          <a:p>
-            <a:pPr marL="457200" lvl="0" indent="-419100">
-              <a:lnSpc>
-                <a:spcPct val="130000"/>
-              </a:lnSpc>
-              <a:buClr>
-                <a:schemeClr val="dk1"/>
-              </a:buClr>
-              <a:buSzPct val="100000"/>
-              <a:buFont typeface="Arial"/>
-              <a:buChar char="●"/>
-            </a:pPr>
-            <a:r>
-              <a:rPr lang="en-US" dirty="0" smtClean="0"/>
-              <a:t>(not a </a:t>
-            </a:r>
-            <a:r>
-              <a:rPr lang="en-US" smtClean="0"/>
-              <a:t>descriptive slide)</a:t>
-            </a:r>
-            <a:endParaRPr lang="en-US" dirty="0" smtClean="0"/>
-          </a:p>
-          <a:p>
-            <a:pPr marL="457200" lvl="0" indent="-419100">
-              <a:lnSpc>
-                <a:spcPct val="130000"/>
-              </a:lnSpc>
-              <a:buClr>
-                <a:schemeClr val="dk1"/>
-              </a:buClr>
-              <a:buSzPct val="100000"/>
-              <a:buFont typeface="Arial"/>
-              <a:buChar char="●"/>
-            </a:pPr>
-            <a:endParaRPr lang="en-US" dirty="0"/>
-          </a:p>
-        </p:txBody>
-      </p:sp>
+      </p:pic>
     </p:spTree>
     <p:extLst>
       <p:ext uri="{BB962C8B-B14F-4D97-AF65-F5344CB8AC3E}">
-        <p14:creationId xmlns:p14="http://schemas.microsoft.com/office/powerpoint/2010/main" val="3893215902"/>
+        <p14:creationId xmlns:p14="http://schemas.microsoft.com/office/powerpoint/2010/main" val="3487993063"/>
       </p:ext>
     </p:extLst>
   </p:cSld>
   <p:clrMapOvr>
     <a:masterClrMapping/>
   </p:clrMapOvr>
-  <p:transition xmlns:p14="http://schemas.microsoft.com/office/powerpoint/2010/main" spd="slow">
-    <p:cut/>
-  </p:transition>
-  <p:timing>
-    <p:tnLst>
-      <p:par>
-        <p:cTn xmlns:p14="http://schemas.microsoft.com/office/powerpoint/2010/main" id="1" dur="indefinite" restart="never" nodeType="tmRoot"/>
-      </p:par>
-    </p:tnLst>
-  </p:timing>
 </p:sld>
 </file>
 
@@ -6640,16 +5955,16 @@
               <a:buNone/>
             </a:pPr>
             <a:r>
-              <a:rPr lang="en-US" sz="7200" dirty="0" smtClean="0">
+              <a:rPr lang="en-US" sz="5500" dirty="0" smtClean="0">
                 <a:solidFill>
                   <a:srgbClr val="FF0000"/>
                 </a:solidFill>
                 <a:latin typeface="Yanone Kaffeesatz Bold"/>
                 <a:cs typeface="Yanone Kaffeesatz Bold"/>
               </a:rPr>
-              <a:t>Reading</a:t>
-            </a:r>
-            <a:endParaRPr lang="en" sz="7200" dirty="0">
+              <a:t>Today (at show and tell)</a:t>
+            </a:r>
+            <a:endParaRPr lang="en" sz="5500" dirty="0">
               <a:solidFill>
                 <a:srgbClr val="FF0000"/>
               </a:solidFill>
@@ -6684,51 +5999,13 @@
           </a:bodyPr>
           <a:lstStyle/>
           <a:p>
-            <a:pPr marL="38100" lvl="0" indent="0">
+            <a:pPr marL="457200" lvl="0" indent="-419100" rtl="0">
               <a:lnSpc>
                 <a:spcPct val="130000"/>
               </a:lnSpc>
-              <a:buClr>
-                <a:schemeClr val="dk1"/>
-              </a:buClr>
-              <a:buSzPct val="100000"/>
-              <a:buNone/>
-            </a:pPr>
-            <a:r>
-              <a:rPr lang="en-US" dirty="0" smtClean="0"/>
-              <a:t>Tanya X Short, “Overcoming Impostor’s </a:t>
-            </a:r>
-            <a:r>
-              <a:rPr lang="en-US" dirty="0"/>
-              <a:t>Syndrome” http://</a:t>
-            </a:r>
-            <a:r>
-              <a:rPr lang="en-US" dirty="0" err="1"/>
-              <a:t>www.gamasutra.com</a:t>
-            </a:r>
-            <a:r>
-              <a:rPr lang="en-US" dirty="0"/>
-              <a:t>/blogs/</a:t>
-            </a:r>
-            <a:r>
-              <a:rPr lang="en-US" dirty="0" err="1"/>
-              <a:t>TanyaXShort</a:t>
-            </a:r>
-            <a:r>
-              <a:rPr lang="en-US" dirty="0"/>
-              <a:t>/20140716/220938/</a:t>
-            </a:r>
-            <a:r>
-              <a:rPr lang="en-US" dirty="0" err="1"/>
-              <a:t>Overcoming_Impostors_Syndrome.php</a:t>
-            </a:r>
-            <a:endParaRPr lang="en-US" dirty="0" smtClean="0"/>
-          </a:p>
-          <a:p>
-            <a:pPr marL="457200" lvl="0" indent="-419100">
-              <a:lnSpc>
-                <a:spcPct val="130000"/>
-              </a:lnSpc>
+              <a:spcBef>
+                <a:spcPts val="0"/>
+              </a:spcBef>
               <a:buClr>
                 <a:schemeClr val="dk1"/>
               </a:buClr>
@@ -6736,14 +6013,17 @@
               <a:buFont typeface="Arial"/>
               <a:buChar char="●"/>
             </a:pPr>
-            <a:endParaRPr lang="en-US" dirty="0"/>
+            <a:r>
+              <a:rPr lang="en-US" dirty="0" smtClean="0"/>
+              <a:t>We need to fill up 5 minutes…</a:t>
+            </a:r>
           </a:p>
         </p:txBody>
       </p:sp>
     </p:spTree>
     <p:extLst>
       <p:ext uri="{BB962C8B-B14F-4D97-AF65-F5344CB8AC3E}">
-        <p14:creationId xmlns:p14="http://schemas.microsoft.com/office/powerpoint/2010/main" val="3547598800"/>
+        <p14:creationId xmlns:p14="http://schemas.microsoft.com/office/powerpoint/2010/main" val="1641007574"/>
       </p:ext>
     </p:extLst>
   </p:cSld>
@@ -6812,16 +6092,16 @@
               <a:buNone/>
             </a:pPr>
             <a:r>
-              <a:rPr lang="en-US" sz="5500" dirty="0" smtClean="0">
+              <a:rPr lang="en-US" sz="7200" dirty="0" smtClean="0">
                 <a:solidFill>
                   <a:srgbClr val="FF0000"/>
                 </a:solidFill>
                 <a:latin typeface="Yanone Kaffeesatz Bold"/>
                 <a:cs typeface="Yanone Kaffeesatz Bold"/>
               </a:rPr>
-              <a:t>Today (at show and tell)</a:t>
-            </a:r>
-            <a:endParaRPr lang="en" sz="5500" dirty="0">
+              <a:t>The plan…</a:t>
+            </a:r>
+            <a:endParaRPr lang="en" sz="7200" dirty="0">
               <a:solidFill>
                 <a:srgbClr val="FF0000"/>
               </a:solidFill>
@@ -6843,7 +6123,7 @@
         </p:nvSpPr>
         <p:spPr>
           <a:xfrm>
-            <a:off x="457200" y="1600200"/>
+            <a:off x="457200" y="1610958"/>
             <a:ext cx="8229600" cy="4967700"/>
           </a:xfrm>
           <a:prstGeom prst="rect">
@@ -6872,15 +6152,77 @@
             </a:pPr>
             <a:r>
               <a:rPr lang="en-US" dirty="0" smtClean="0"/>
-              <a:t>We need to fill up 5 minutes…</a:t>
-            </a:r>
+              <a:t>Work through Python in practice</a:t>
+            </a:r>
+          </a:p>
+          <a:p>
+            <a:pPr marL="457200" lvl="0" indent="-419100" rtl="0">
+              <a:lnSpc>
+                <a:spcPct val="130000"/>
+              </a:lnSpc>
+              <a:spcBef>
+                <a:spcPts val="0"/>
+              </a:spcBef>
+              <a:buClr>
+                <a:schemeClr val="dk1"/>
+              </a:buClr>
+              <a:buSzPct val="100000"/>
+              <a:buFont typeface="Arial"/>
+              <a:buChar char="●"/>
+            </a:pPr>
+            <a:r>
+              <a:rPr lang="en-US" dirty="0"/>
+              <a:t>Give some real-world examples of using Python</a:t>
+            </a:r>
+            <a:endParaRPr lang="en-US" dirty="0" smtClean="0"/>
+          </a:p>
+          <a:p>
+            <a:pPr marL="457200" lvl="0" indent="-419100" rtl="0">
+              <a:lnSpc>
+                <a:spcPct val="130000"/>
+              </a:lnSpc>
+              <a:spcBef>
+                <a:spcPts val="0"/>
+              </a:spcBef>
+              <a:buClr>
+                <a:schemeClr val="dk1"/>
+              </a:buClr>
+              <a:buSzPct val="100000"/>
+              <a:buFont typeface="Arial"/>
+              <a:buChar char="●"/>
+            </a:pPr>
+            <a:r>
+              <a:rPr lang="en-US" dirty="0"/>
+              <a:t>Discuss anything you want</a:t>
+            </a:r>
+          </a:p>
+          <a:p>
+            <a:pPr marL="457200" lvl="0" indent="-419100" rtl="0">
+              <a:lnSpc>
+                <a:spcPct val="130000"/>
+              </a:lnSpc>
+              <a:spcBef>
+                <a:spcPts val="0"/>
+              </a:spcBef>
+              <a:buClr>
+                <a:schemeClr val="dk1"/>
+              </a:buClr>
+              <a:buSzPct val="100000"/>
+              <a:buFont typeface="Arial"/>
+              <a:buChar char="●"/>
+            </a:pPr>
+            <a:r>
+              <a:rPr lang="en-US" dirty="0"/>
+              <a:t>Install on your own laptops</a:t>
+            </a:r>
+            <a:endParaRPr lang="en-US" dirty="0" smtClean="0"/>
           </a:p>
         </p:txBody>
       </p:sp>
     </p:spTree>
     <p:extLst>
       <p:ext uri="{BB962C8B-B14F-4D97-AF65-F5344CB8AC3E}">
-        <p14:creationId xmlns:p14="http://schemas.microsoft.com/office/powerpoint/2010/main" val="1641007574"/>
+        <p14:creationId xmlns:p14="http://schemas.microsoft.com/office/powerpoint/2010/main" val="3323198116"/>
       </p:ext>
     </p:extLst>
   </p:cSld>

</xml_diff>